<commit_message>
fix typo from lecture!
</commit_message>
<xml_diff>
--- a/lectures/04-11-wed/slides-handout.pptx
+++ b/lectures/04-11-wed/slides-handout.pptx
@@ -111,6 +111,11 @@
       </a:defRPr>
     </a:lvl9pPr>
   </p:defaultTextStyle>
+  <p:extLst>
+    <p:ext uri="{EFAFB233-063F-42B5-8137-9DF3F51BA10A}">
+      <p15:sldGuideLst xmlns:p15="http://schemas.microsoft.com/office/powerpoint/2012/main"/>
+    </p:ext>
+  </p:extLst>
 </p:presentation>
 </file>
 
@@ -245,7 +250,7 @@
           <a:p>
             <a:fld id="{AA3151EC-F17C-154F-9021-E2F733308F92}" type="datetimeFigureOut">
               <a:rPr lang="en-US" smtClean="0"/>
-              <a:t>4/10/18</a:t>
+              <a:t>4/12/18</a:t>
             </a:fld>
             <a:endParaRPr lang="en-US"/>
           </a:p>
@@ -415,7 +420,7 @@
           <a:p>
             <a:fld id="{AA3151EC-F17C-154F-9021-E2F733308F92}" type="datetimeFigureOut">
               <a:rPr lang="en-US" smtClean="0"/>
-              <a:t>4/10/18</a:t>
+              <a:t>4/12/18</a:t>
             </a:fld>
             <a:endParaRPr lang="en-US"/>
           </a:p>
@@ -595,7 +600,7 @@
           <a:p>
             <a:fld id="{AA3151EC-F17C-154F-9021-E2F733308F92}" type="datetimeFigureOut">
               <a:rPr lang="en-US" smtClean="0"/>
-              <a:t>4/10/18</a:t>
+              <a:t>4/12/18</a:t>
             </a:fld>
             <a:endParaRPr lang="en-US"/>
           </a:p>
@@ -765,7 +770,7 @@
           <a:p>
             <a:fld id="{AA3151EC-F17C-154F-9021-E2F733308F92}" type="datetimeFigureOut">
               <a:rPr lang="en-US" smtClean="0"/>
-              <a:t>4/10/18</a:t>
+              <a:t>4/12/18</a:t>
             </a:fld>
             <a:endParaRPr lang="en-US"/>
           </a:p>
@@ -1009,7 +1014,7 @@
           <a:p>
             <a:fld id="{AA3151EC-F17C-154F-9021-E2F733308F92}" type="datetimeFigureOut">
               <a:rPr lang="en-US" smtClean="0"/>
-              <a:t>4/10/18</a:t>
+              <a:t>4/12/18</a:t>
             </a:fld>
             <a:endParaRPr lang="en-US"/>
           </a:p>
@@ -1241,7 +1246,7 @@
           <a:p>
             <a:fld id="{AA3151EC-F17C-154F-9021-E2F733308F92}" type="datetimeFigureOut">
               <a:rPr lang="en-US" smtClean="0"/>
-              <a:t>4/10/18</a:t>
+              <a:t>4/12/18</a:t>
             </a:fld>
             <a:endParaRPr lang="en-US"/>
           </a:p>
@@ -1608,7 +1613,7 @@
           <a:p>
             <a:fld id="{AA3151EC-F17C-154F-9021-E2F733308F92}" type="datetimeFigureOut">
               <a:rPr lang="en-US" smtClean="0"/>
-              <a:t>4/10/18</a:t>
+              <a:t>4/12/18</a:t>
             </a:fld>
             <a:endParaRPr lang="en-US"/>
           </a:p>
@@ -1726,7 +1731,7 @@
           <a:p>
             <a:fld id="{AA3151EC-F17C-154F-9021-E2F733308F92}" type="datetimeFigureOut">
               <a:rPr lang="en-US" smtClean="0"/>
-              <a:t>4/10/18</a:t>
+              <a:t>4/12/18</a:t>
             </a:fld>
             <a:endParaRPr lang="en-US"/>
           </a:p>
@@ -1821,7 +1826,7 @@
           <a:p>
             <a:fld id="{AA3151EC-F17C-154F-9021-E2F733308F92}" type="datetimeFigureOut">
               <a:rPr lang="en-US" smtClean="0"/>
-              <a:t>4/10/18</a:t>
+              <a:t>4/12/18</a:t>
             </a:fld>
             <a:endParaRPr lang="en-US"/>
           </a:p>
@@ -2098,7 +2103,7 @@
           <a:p>
             <a:fld id="{AA3151EC-F17C-154F-9021-E2F733308F92}" type="datetimeFigureOut">
               <a:rPr lang="en-US" smtClean="0"/>
-              <a:t>4/10/18</a:t>
+              <a:t>4/12/18</a:t>
             </a:fld>
             <a:endParaRPr lang="en-US"/>
           </a:p>
@@ -2355,7 +2360,7 @@
           <a:p>
             <a:fld id="{AA3151EC-F17C-154F-9021-E2F733308F92}" type="datetimeFigureOut">
               <a:rPr lang="en-US" smtClean="0"/>
-              <a:t>4/10/18</a:t>
+              <a:t>4/12/18</a:t>
             </a:fld>
             <a:endParaRPr lang="en-US"/>
           </a:p>
@@ -2568,7 +2573,7 @@
           <a:p>
             <a:fld id="{AA3151EC-F17C-154F-9021-E2F733308F92}" type="datetimeFigureOut">
               <a:rPr lang="en-US" smtClean="0"/>
-              <a:t>4/10/18</a:t>
+              <a:t>4/12/18</a:t>
             </a:fld>
             <a:endParaRPr lang="en-US"/>
           </a:p>
@@ -9924,7 +9929,7 @@
                 <a:latin typeface="Consolas" panose="020B0609020204030204" pitchFamily="49" charset="0"/>
                 <a:cs typeface="Consolas" panose="020B0609020204030204" pitchFamily="49" charset="0"/>
               </a:rPr>
-              <a:t>| [Atom("let"); bind; body]-&gt;</a:t>
+              <a:t>| [Atom("let"); List(bind); body]-&gt;</a:t>
             </a:r>
             <a:br>
               <a:rPr lang="en-US" sz="1400" dirty="0">
@@ -9950,7 +9955,35 @@
                 <a:latin typeface="Consolas" panose="020B0609020204030204" pitchFamily="49" charset="0"/>
                 <a:cs typeface="Consolas" panose="020B0609020204030204" pitchFamily="49" charset="0"/>
               </a:rPr>
-              <a:t>    | [Atom(name); e] -&gt;</a:t>
+              <a:t>    </a:t>
+            </a:r>
+            <a:r>
+              <a:rPr lang="en-US" sz="1400">
+                <a:latin typeface="Consolas" panose="020B0609020204030204" pitchFamily="49" charset="0"/>
+                <a:cs typeface="Consolas" panose="020B0609020204030204" pitchFamily="49" charset="0"/>
+              </a:rPr>
+              <a:t>| [Atom</a:t>
+            </a:r>
+            <a:r>
+              <a:rPr lang="en-US" sz="1400" dirty="0">
+                <a:latin typeface="Consolas" panose="020B0609020204030204" pitchFamily="49" charset="0"/>
+                <a:cs typeface="Consolas" panose="020B0609020204030204" pitchFamily="49" charset="0"/>
+              </a:rPr>
+              <a:t>(name); </a:t>
+            </a:r>
+            <a:r>
+              <a:rPr lang="en-US" sz="1400">
+                <a:latin typeface="Consolas" panose="020B0609020204030204" pitchFamily="49" charset="0"/>
+                <a:cs typeface="Consolas" panose="020B0609020204030204" pitchFamily="49" charset="0"/>
+              </a:rPr>
+              <a:t>e] </a:t>
+            </a:r>
+            <a:r>
+              <a:rPr lang="en-US" sz="1400" dirty="0">
+                <a:latin typeface="Consolas" panose="020B0609020204030204" pitchFamily="49" charset="0"/>
+                <a:cs typeface="Consolas" panose="020B0609020204030204" pitchFamily="49" charset="0"/>
+              </a:rPr>
+              <a:t>-&gt;</a:t>
             </a:r>
             <a:br>
               <a:rPr lang="en-US" sz="1400" dirty="0">

</xml_diff>